<commit_message>
Image ajoutée au PowerPoint
</commit_message>
<xml_diff>
--- a/Présentation1.pptx
+++ b/Présentation1.pptx
@@ -6624,6 +6624,13 @@
   <p:clrMapOvr>
     <a:masterClrMapping/>
   </p:clrMapOvr>
+  <p:timing>
+    <p:tnLst>
+      <p:par>
+        <p:cTn id="1" dur="indefinite" restart="never" nodeType="tmRoot"/>
+      </p:par>
+    </p:tnLst>
+  </p:timing>
 </p:sld>
 </file>
 
@@ -6742,6 +6749,13 @@
   <p:clrMapOvr>
     <a:masterClrMapping/>
   </p:clrMapOvr>
+  <p:timing>
+    <p:tnLst>
+      <p:par>
+        <p:cTn id="1" dur="indefinite" restart="never" nodeType="tmRoot"/>
+      </p:par>
+    </p:tnLst>
+  </p:timing>
 </p:sld>
 </file>
 
@@ -7159,6 +7173,13 @@
   <p:clrMapOvr>
     <a:masterClrMapping/>
   </p:clrMapOvr>
+  <p:timing>
+    <p:tnLst>
+      <p:par>
+        <p:cTn id="1" dur="indefinite" restart="never" nodeType="tmRoot"/>
+      </p:par>
+    </p:tnLst>
+  </p:timing>
 </p:sld>
 </file>
 
@@ -7502,6 +7523,13 @@
   <p:clrMapOvr>
     <a:masterClrMapping/>
   </p:clrMapOvr>
+  <p:timing>
+    <p:tnLst>
+      <p:par>
+        <p:cTn id="1" dur="indefinite" restart="never" nodeType="tmRoot"/>
+      </p:par>
+    </p:tnLst>
+  </p:timing>
 </p:sld>
 </file>
 
@@ -7848,6 +7876,35 @@
           </a:p>
         </p:txBody>
       </p:sp>
+      <p:pic>
+        <p:nvPicPr>
+          <p:cNvPr id="4" name="Image 3"/>
+          <p:cNvPicPr>
+            <a:picLocks noChangeAspect="1"/>
+          </p:cNvPicPr>
+          <p:nvPr/>
+        </p:nvPicPr>
+        <p:blipFill rotWithShape="1">
+          <a:blip r:embed="rId2">
+            <a:extLst>
+              <a:ext uri="{28A0092B-C50C-407E-A947-70E740481C1C}">
+                <a14:useLocalDpi xmlns:a14="http://schemas.microsoft.com/office/drawing/2010/main" val="0"/>
+              </a:ext>
+            </a:extLst>
+          </a:blip>
+          <a:srcRect t="-739" r="35290"/>
+          <a:stretch/>
+        </p:blipFill>
+        <p:spPr>
+          <a:xfrm>
+            <a:off x="7954012" y="1004156"/>
+            <a:ext cx="3537284" cy="2124179"/>
+          </a:xfrm>
+          <a:prstGeom prst="rect">
+            <a:avLst/>
+          </a:prstGeom>
+        </p:spPr>
+      </p:pic>
     </p:spTree>
     <p:extLst>
       <p:ext uri="{BB962C8B-B14F-4D97-AF65-F5344CB8AC3E}">
@@ -7858,6 +7915,13 @@
   <p:clrMapOvr>
     <a:masterClrMapping/>
   </p:clrMapOvr>
+  <p:timing>
+    <p:tnLst>
+      <p:par>
+        <p:cTn id="1" dur="indefinite" restart="never" nodeType="tmRoot"/>
+      </p:par>
+    </p:tnLst>
+  </p:timing>
 </p:sld>
 </file>
 
@@ -8205,6 +8269,13 @@
   <p:clrMapOvr>
     <a:masterClrMapping/>
   </p:clrMapOvr>
+  <p:timing>
+    <p:tnLst>
+      <p:par>
+        <p:cTn id="1" dur="indefinite" restart="never" nodeType="tmRoot"/>
+      </p:par>
+    </p:tnLst>
+  </p:timing>
 </p:sld>
 </file>
 
@@ -8308,6 +8379,13 @@
   <p:clrMapOvr>
     <a:masterClrMapping/>
   </p:clrMapOvr>
+  <p:timing>
+    <p:tnLst>
+      <p:par>
+        <p:cTn id="1" dur="indefinite" restart="never" nodeType="tmRoot"/>
+      </p:par>
+    </p:tnLst>
+  </p:timing>
 </p:sld>
 </file>
 

</xml_diff>